<commit_message>
add Vor- & Nachteile
</commit_message>
<xml_diff>
--- a/Quaternionen Präsentation.pptx
+++ b/Quaternionen Präsentation.pptx
@@ -4263,43 +4263,461 @@
       </p:sp>
       <p:sp>
         <p:nvSpPr>
-          <p:cNvPr id="3" name="Inhaltsplatzhalter 2">
-            <a:extLst>
-              <a:ext uri="{FF2B5EF4-FFF2-40B4-BE49-F238E27FC236}">
-                <a16:creationId xmlns:a16="http://schemas.microsoft.com/office/drawing/2014/main" id="{DE41DD4B-3F2A-44CB-B8C3-CCAE040F33A1}"/>
-              </a:ext>
-            </a:extLst>
-          </p:cNvPr>
-          <p:cNvSpPr>
-            <a:spLocks noGrp="1"/>
-          </p:cNvSpPr>
-          <p:nvPr>
-            <p:ph idx="1"/>
-          </p:nvPr>
+          <p:cNvPr id="7" name="Inhaltsplatzhalter 2">
+            <a:extLst>
+              <a:ext uri="{FF2B5EF4-FFF2-40B4-BE49-F238E27FC236}">
+                <a16:creationId xmlns:a16="http://schemas.microsoft.com/office/drawing/2014/main" id="{2122E75A-90D9-4EF0-9B2C-044FC5F391F4}"/>
+              </a:ext>
+            </a:extLst>
+          </p:cNvPr>
+          <p:cNvSpPr txBox="1">
+            <a:spLocks/>
+          </p:cNvSpPr>
+          <p:nvPr/>
         </p:nvSpPr>
         <p:spPr>
           <a:xfrm>
-            <a:off x="684212" y="2438400"/>
-            <a:ext cx="6224588" cy="3615267"/>
+            <a:off x="684212" y="2192867"/>
+            <a:ext cx="5230557" cy="3031524"/>
           </a:xfrm>
+          <a:prstGeom prst="rect">
+            <a:avLst/>
+          </a:prstGeom>
         </p:spPr>
         <p:txBody>
-          <a:bodyPr/>
-          <a:lstStyle/>
+          <a:bodyPr vert="horz" lIns="91440" tIns="45720" rIns="91440" bIns="45720" rtlCol="0">
+            <a:normAutofit/>
+          </a:bodyPr>
+          <a:lstStyle>
+            <a:lvl1pPr marL="228600" indent="-228600" algn="l" defTabSz="914400" rtl="0" eaLnBrk="1" latinLnBrk="0" hangingPunct="1">
+              <a:lnSpc>
+                <a:spcPct val="90000"/>
+              </a:lnSpc>
+              <a:spcBef>
+                <a:spcPts val="1000"/>
+              </a:spcBef>
+              <a:buFont typeface="Arial" panose="020B0604020202020204" pitchFamily="34" charset="0"/>
+              <a:buChar char="•"/>
+              <a:defRPr sz="2800" kern="1200">
+                <a:solidFill>
+                  <a:schemeClr val="tx1"/>
+                </a:solidFill>
+                <a:latin typeface="+mn-lt"/>
+                <a:ea typeface="+mn-ea"/>
+                <a:cs typeface="+mn-cs"/>
+              </a:defRPr>
+            </a:lvl1pPr>
+            <a:lvl2pPr marL="685800" indent="-228600" algn="l" defTabSz="914400" rtl="0" eaLnBrk="1" latinLnBrk="0" hangingPunct="1">
+              <a:lnSpc>
+                <a:spcPct val="90000"/>
+              </a:lnSpc>
+              <a:spcBef>
+                <a:spcPts val="500"/>
+              </a:spcBef>
+              <a:buFont typeface="Arial" panose="020B0604020202020204" pitchFamily="34" charset="0"/>
+              <a:buChar char="•"/>
+              <a:defRPr sz="2400" kern="1200">
+                <a:solidFill>
+                  <a:schemeClr val="tx1"/>
+                </a:solidFill>
+                <a:latin typeface="+mn-lt"/>
+                <a:ea typeface="+mn-ea"/>
+                <a:cs typeface="+mn-cs"/>
+              </a:defRPr>
+            </a:lvl2pPr>
+            <a:lvl3pPr marL="1143000" indent="-228600" algn="l" defTabSz="914400" rtl="0" eaLnBrk="1" latinLnBrk="0" hangingPunct="1">
+              <a:lnSpc>
+                <a:spcPct val="90000"/>
+              </a:lnSpc>
+              <a:spcBef>
+                <a:spcPts val="500"/>
+              </a:spcBef>
+              <a:buFont typeface="Arial" panose="020B0604020202020204" pitchFamily="34" charset="0"/>
+              <a:buChar char="•"/>
+              <a:defRPr sz="2000" kern="1200">
+                <a:solidFill>
+                  <a:schemeClr val="tx1"/>
+                </a:solidFill>
+                <a:latin typeface="+mn-lt"/>
+                <a:ea typeface="+mn-ea"/>
+                <a:cs typeface="+mn-cs"/>
+              </a:defRPr>
+            </a:lvl3pPr>
+            <a:lvl4pPr marL="1600200" indent="-228600" algn="l" defTabSz="914400" rtl="0" eaLnBrk="1" latinLnBrk="0" hangingPunct="1">
+              <a:lnSpc>
+                <a:spcPct val="90000"/>
+              </a:lnSpc>
+              <a:spcBef>
+                <a:spcPts val="500"/>
+              </a:spcBef>
+              <a:buFont typeface="Arial" panose="020B0604020202020204" pitchFamily="34" charset="0"/>
+              <a:buChar char="•"/>
+              <a:defRPr sz="1800" kern="1200">
+                <a:solidFill>
+                  <a:schemeClr val="tx1"/>
+                </a:solidFill>
+                <a:latin typeface="+mn-lt"/>
+                <a:ea typeface="+mn-ea"/>
+                <a:cs typeface="+mn-cs"/>
+              </a:defRPr>
+            </a:lvl4pPr>
+            <a:lvl5pPr marL="2057400" indent="-228600" algn="l" defTabSz="914400" rtl="0" eaLnBrk="1" latinLnBrk="0" hangingPunct="1">
+              <a:lnSpc>
+                <a:spcPct val="90000"/>
+              </a:lnSpc>
+              <a:spcBef>
+                <a:spcPts val="500"/>
+              </a:spcBef>
+              <a:buFont typeface="Arial" panose="020B0604020202020204" pitchFamily="34" charset="0"/>
+              <a:buChar char="•"/>
+              <a:defRPr sz="1800" kern="1200">
+                <a:solidFill>
+                  <a:schemeClr val="tx1"/>
+                </a:solidFill>
+                <a:latin typeface="+mn-lt"/>
+                <a:ea typeface="+mn-ea"/>
+                <a:cs typeface="+mn-cs"/>
+              </a:defRPr>
+            </a:lvl5pPr>
+            <a:lvl6pPr marL="2514600" indent="-228600" algn="l" defTabSz="914400" rtl="0" eaLnBrk="1" latinLnBrk="0" hangingPunct="1">
+              <a:lnSpc>
+                <a:spcPct val="90000"/>
+              </a:lnSpc>
+              <a:spcBef>
+                <a:spcPts val="500"/>
+              </a:spcBef>
+              <a:buFont typeface="Arial" panose="020B0604020202020204" pitchFamily="34" charset="0"/>
+              <a:buChar char="•"/>
+              <a:defRPr sz="1800" kern="1200">
+                <a:solidFill>
+                  <a:schemeClr val="tx1"/>
+                </a:solidFill>
+                <a:latin typeface="+mn-lt"/>
+                <a:ea typeface="+mn-ea"/>
+                <a:cs typeface="+mn-cs"/>
+              </a:defRPr>
+            </a:lvl6pPr>
+            <a:lvl7pPr marL="2971800" indent="-228600" algn="l" defTabSz="914400" rtl="0" eaLnBrk="1" latinLnBrk="0" hangingPunct="1">
+              <a:lnSpc>
+                <a:spcPct val="90000"/>
+              </a:lnSpc>
+              <a:spcBef>
+                <a:spcPts val="500"/>
+              </a:spcBef>
+              <a:buFont typeface="Arial" panose="020B0604020202020204" pitchFamily="34" charset="0"/>
+              <a:buChar char="•"/>
+              <a:defRPr sz="1800" kern="1200">
+                <a:solidFill>
+                  <a:schemeClr val="tx1"/>
+                </a:solidFill>
+                <a:latin typeface="+mn-lt"/>
+                <a:ea typeface="+mn-ea"/>
+                <a:cs typeface="+mn-cs"/>
+              </a:defRPr>
+            </a:lvl7pPr>
+            <a:lvl8pPr marL="3429000" indent="-228600" algn="l" defTabSz="914400" rtl="0" eaLnBrk="1" latinLnBrk="0" hangingPunct="1">
+              <a:lnSpc>
+                <a:spcPct val="90000"/>
+              </a:lnSpc>
+              <a:spcBef>
+                <a:spcPts val="500"/>
+              </a:spcBef>
+              <a:buFont typeface="Arial" panose="020B0604020202020204" pitchFamily="34" charset="0"/>
+              <a:buChar char="•"/>
+              <a:defRPr sz="1800" kern="1200">
+                <a:solidFill>
+                  <a:schemeClr val="tx1"/>
+                </a:solidFill>
+                <a:latin typeface="+mn-lt"/>
+                <a:ea typeface="+mn-ea"/>
+                <a:cs typeface="+mn-cs"/>
+              </a:defRPr>
+            </a:lvl8pPr>
+            <a:lvl9pPr marL="3886200" indent="-228600" algn="l" defTabSz="914400" rtl="0" eaLnBrk="1" latinLnBrk="0" hangingPunct="1">
+              <a:lnSpc>
+                <a:spcPct val="90000"/>
+              </a:lnSpc>
+              <a:spcBef>
+                <a:spcPts val="500"/>
+              </a:spcBef>
+              <a:buFont typeface="Arial" panose="020B0604020202020204" pitchFamily="34" charset="0"/>
+              <a:buChar char="•"/>
+              <a:defRPr sz="1800" kern="1200">
+                <a:solidFill>
+                  <a:schemeClr val="tx1"/>
+                </a:solidFill>
+                <a:latin typeface="+mn-lt"/>
+                <a:ea typeface="+mn-ea"/>
+                <a:cs typeface="+mn-cs"/>
+              </a:defRPr>
+            </a:lvl9pPr>
+          </a:lstStyle>
+          <a:p>
+            <a:r>
+              <a:rPr lang="de-DE"/>
+              <a:t>Kein Standardthema</a:t>
+            </a:r>
+          </a:p>
+          <a:p>
+            <a:r>
+              <a:rPr lang="de-DE"/>
+              <a:t>Umrechnungen von Matrizen und Quaternionen</a:t>
+            </a:r>
+          </a:p>
+          <a:p>
+            <a:endParaRPr lang="de-DE" dirty="0"/>
+          </a:p>
+        </p:txBody>
+      </p:sp>
+      <p:sp>
+        <p:nvSpPr>
+          <p:cNvPr id="8" name="Inhaltsplatzhalter 2">
+            <a:extLst>
+              <a:ext uri="{FF2B5EF4-FFF2-40B4-BE49-F238E27FC236}">
+                <a16:creationId xmlns:a16="http://schemas.microsoft.com/office/drawing/2014/main" id="{342F297D-54FE-48D2-89AE-EBE69AE9CF74}"/>
+              </a:ext>
+            </a:extLst>
+          </p:cNvPr>
+          <p:cNvSpPr txBox="1">
+            <a:spLocks/>
+          </p:cNvSpPr>
+          <p:nvPr/>
+        </p:nvSpPr>
+        <p:spPr>
+          <a:xfrm>
+            <a:off x="6603333" y="2093554"/>
+            <a:ext cx="5230557" cy="3615267"/>
+          </a:xfrm>
+          <a:prstGeom prst="rect">
+            <a:avLst/>
+          </a:prstGeom>
+        </p:spPr>
+        <p:txBody>
+          <a:bodyPr vert="horz" lIns="91440" tIns="45720" rIns="91440" bIns="45720" rtlCol="0">
+            <a:normAutofit/>
+          </a:bodyPr>
+          <a:lstStyle>
+            <a:lvl1pPr marL="228600" indent="-228600" algn="l" defTabSz="914400" rtl="0" eaLnBrk="1" latinLnBrk="0" hangingPunct="1">
+              <a:lnSpc>
+                <a:spcPct val="90000"/>
+              </a:lnSpc>
+              <a:spcBef>
+                <a:spcPts val="1000"/>
+              </a:spcBef>
+              <a:buFont typeface="Arial" panose="020B0604020202020204" pitchFamily="34" charset="0"/>
+              <a:buChar char="•"/>
+              <a:defRPr sz="2800" kern="1200">
+                <a:solidFill>
+                  <a:schemeClr val="tx1"/>
+                </a:solidFill>
+                <a:latin typeface="+mn-lt"/>
+                <a:ea typeface="+mn-ea"/>
+                <a:cs typeface="+mn-cs"/>
+              </a:defRPr>
+            </a:lvl1pPr>
+            <a:lvl2pPr marL="685800" indent="-228600" algn="l" defTabSz="914400" rtl="0" eaLnBrk="1" latinLnBrk="0" hangingPunct="1">
+              <a:lnSpc>
+                <a:spcPct val="90000"/>
+              </a:lnSpc>
+              <a:spcBef>
+                <a:spcPts val="500"/>
+              </a:spcBef>
+              <a:buFont typeface="Arial" panose="020B0604020202020204" pitchFamily="34" charset="0"/>
+              <a:buChar char="•"/>
+              <a:defRPr sz="2400" kern="1200">
+                <a:solidFill>
+                  <a:schemeClr val="tx1"/>
+                </a:solidFill>
+                <a:latin typeface="+mn-lt"/>
+                <a:ea typeface="+mn-ea"/>
+                <a:cs typeface="+mn-cs"/>
+              </a:defRPr>
+            </a:lvl2pPr>
+            <a:lvl3pPr marL="1143000" indent="-228600" algn="l" defTabSz="914400" rtl="0" eaLnBrk="1" latinLnBrk="0" hangingPunct="1">
+              <a:lnSpc>
+                <a:spcPct val="90000"/>
+              </a:lnSpc>
+              <a:spcBef>
+                <a:spcPts val="500"/>
+              </a:spcBef>
+              <a:buFont typeface="Arial" panose="020B0604020202020204" pitchFamily="34" charset="0"/>
+              <a:buChar char="•"/>
+              <a:defRPr sz="2000" kern="1200">
+                <a:solidFill>
+                  <a:schemeClr val="tx1"/>
+                </a:solidFill>
+                <a:latin typeface="+mn-lt"/>
+                <a:ea typeface="+mn-ea"/>
+                <a:cs typeface="+mn-cs"/>
+              </a:defRPr>
+            </a:lvl3pPr>
+            <a:lvl4pPr marL="1600200" indent="-228600" algn="l" defTabSz="914400" rtl="0" eaLnBrk="1" latinLnBrk="0" hangingPunct="1">
+              <a:lnSpc>
+                <a:spcPct val="90000"/>
+              </a:lnSpc>
+              <a:spcBef>
+                <a:spcPts val="500"/>
+              </a:spcBef>
+              <a:buFont typeface="Arial" panose="020B0604020202020204" pitchFamily="34" charset="0"/>
+              <a:buChar char="•"/>
+              <a:defRPr sz="1800" kern="1200">
+                <a:solidFill>
+                  <a:schemeClr val="tx1"/>
+                </a:solidFill>
+                <a:latin typeface="+mn-lt"/>
+                <a:ea typeface="+mn-ea"/>
+                <a:cs typeface="+mn-cs"/>
+              </a:defRPr>
+            </a:lvl4pPr>
+            <a:lvl5pPr marL="2057400" indent="-228600" algn="l" defTabSz="914400" rtl="0" eaLnBrk="1" latinLnBrk="0" hangingPunct="1">
+              <a:lnSpc>
+                <a:spcPct val="90000"/>
+              </a:lnSpc>
+              <a:spcBef>
+                <a:spcPts val="500"/>
+              </a:spcBef>
+              <a:buFont typeface="Arial" panose="020B0604020202020204" pitchFamily="34" charset="0"/>
+              <a:buChar char="•"/>
+              <a:defRPr sz="1800" kern="1200">
+                <a:solidFill>
+                  <a:schemeClr val="tx1"/>
+                </a:solidFill>
+                <a:latin typeface="+mn-lt"/>
+                <a:ea typeface="+mn-ea"/>
+                <a:cs typeface="+mn-cs"/>
+              </a:defRPr>
+            </a:lvl5pPr>
+            <a:lvl6pPr marL="2514600" indent="-228600" algn="l" defTabSz="914400" rtl="0" eaLnBrk="1" latinLnBrk="0" hangingPunct="1">
+              <a:lnSpc>
+                <a:spcPct val="90000"/>
+              </a:lnSpc>
+              <a:spcBef>
+                <a:spcPts val="500"/>
+              </a:spcBef>
+              <a:buFont typeface="Arial" panose="020B0604020202020204" pitchFamily="34" charset="0"/>
+              <a:buChar char="•"/>
+              <a:defRPr sz="1800" kern="1200">
+                <a:solidFill>
+                  <a:schemeClr val="tx1"/>
+                </a:solidFill>
+                <a:latin typeface="+mn-lt"/>
+                <a:ea typeface="+mn-ea"/>
+                <a:cs typeface="+mn-cs"/>
+              </a:defRPr>
+            </a:lvl6pPr>
+            <a:lvl7pPr marL="2971800" indent="-228600" algn="l" defTabSz="914400" rtl="0" eaLnBrk="1" latinLnBrk="0" hangingPunct="1">
+              <a:lnSpc>
+                <a:spcPct val="90000"/>
+              </a:lnSpc>
+              <a:spcBef>
+                <a:spcPts val="500"/>
+              </a:spcBef>
+              <a:buFont typeface="Arial" panose="020B0604020202020204" pitchFamily="34" charset="0"/>
+              <a:buChar char="•"/>
+              <a:defRPr sz="1800" kern="1200">
+                <a:solidFill>
+                  <a:schemeClr val="tx1"/>
+                </a:solidFill>
+                <a:latin typeface="+mn-lt"/>
+                <a:ea typeface="+mn-ea"/>
+                <a:cs typeface="+mn-cs"/>
+              </a:defRPr>
+            </a:lvl7pPr>
+            <a:lvl8pPr marL="3429000" indent="-228600" algn="l" defTabSz="914400" rtl="0" eaLnBrk="1" latinLnBrk="0" hangingPunct="1">
+              <a:lnSpc>
+                <a:spcPct val="90000"/>
+              </a:lnSpc>
+              <a:spcBef>
+                <a:spcPts val="500"/>
+              </a:spcBef>
+              <a:buFont typeface="Arial" panose="020B0604020202020204" pitchFamily="34" charset="0"/>
+              <a:buChar char="•"/>
+              <a:defRPr sz="1800" kern="1200">
+                <a:solidFill>
+                  <a:schemeClr val="tx1"/>
+                </a:solidFill>
+                <a:latin typeface="+mn-lt"/>
+                <a:ea typeface="+mn-ea"/>
+                <a:cs typeface="+mn-cs"/>
+              </a:defRPr>
+            </a:lvl8pPr>
+            <a:lvl9pPr marL="3886200" indent="-228600" algn="l" defTabSz="914400" rtl="0" eaLnBrk="1" latinLnBrk="0" hangingPunct="1">
+              <a:lnSpc>
+                <a:spcPct val="90000"/>
+              </a:lnSpc>
+              <a:spcBef>
+                <a:spcPts val="500"/>
+              </a:spcBef>
+              <a:buFont typeface="Arial" panose="020B0604020202020204" pitchFamily="34" charset="0"/>
+              <a:buChar char="•"/>
+              <a:defRPr sz="1800" kern="1200">
+                <a:solidFill>
+                  <a:schemeClr val="tx1"/>
+                </a:solidFill>
+                <a:latin typeface="+mn-lt"/>
+                <a:ea typeface="+mn-ea"/>
+                <a:cs typeface="+mn-cs"/>
+              </a:defRPr>
+            </a:lvl9pPr>
+          </a:lstStyle>
           <a:p>
             <a:r>
               <a:rPr lang="de-DE" dirty="0"/>
-              <a:t>Vor- und Nachteile</a:t>
-            </a:r>
+              <a:t>Koordinatensystem unabhängig</a:t>
+            </a:r>
+          </a:p>
+          <a:p>
+            <a:r>
+              <a:rPr lang="de-DE" dirty="0"/>
+              <a:t>Kein </a:t>
+            </a:r>
+            <a:r>
+              <a:rPr lang="de-DE" dirty="0" err="1"/>
+              <a:t>Gimbal</a:t>
+            </a:r>
+            <a:r>
+              <a:rPr lang="de-DE" dirty="0"/>
+              <a:t> Lock</a:t>
+            </a:r>
+          </a:p>
+          <a:p>
+            <a:r>
+              <a:rPr lang="de-DE" dirty="0"/>
+              <a:t>Kompakte Rotation</a:t>
+            </a:r>
+          </a:p>
+          <a:p>
+            <a:r>
+              <a:rPr lang="de-DE" dirty="0"/>
+              <a:t>Glattere Interpolationen</a:t>
+            </a:r>
+          </a:p>
+          <a:p>
+            <a:r>
+              <a:rPr lang="de-DE" dirty="0"/>
+              <a:t>Offensichtlichere Geometrie</a:t>
+            </a:r>
+          </a:p>
+          <a:p>
+            <a:r>
+              <a:rPr lang="de-DE" dirty="0"/>
+              <a:t>Niedrigerer Rechenaufwand</a:t>
+            </a:r>
+          </a:p>
+          <a:p>
+            <a:endParaRPr lang="de-DE" dirty="0"/>
+          </a:p>
+          <a:p>
+            <a:endParaRPr lang="de-DE" dirty="0"/>
           </a:p>
         </p:txBody>
       </p:sp>
       <p:pic>
         <p:nvPicPr>
-          <p:cNvPr id="2052" name="Picture 4" descr="Pro Contra Icon - Illustrationen und Vektorgrafiken">
-            <a:extLst>
-              <a:ext uri="{FF2B5EF4-FFF2-40B4-BE49-F238E27FC236}">
-                <a16:creationId xmlns:a16="http://schemas.microsoft.com/office/drawing/2014/main" id="{2E6D480D-A0A8-4976-BF38-794174D4FF03}"/>
+          <p:cNvPr id="9" name="Picture 4" descr="Pro Contra Icon - Illustrationen und Vektorgrafiken">
+            <a:extLst>
+              <a:ext uri="{FF2B5EF4-FFF2-40B4-BE49-F238E27FC236}">
+                <a16:creationId xmlns:a16="http://schemas.microsoft.com/office/drawing/2014/main" id="{B22CD9F5-F718-4109-AF29-6E3118608173}"/>
               </a:ext>
             </a:extLst>
           </p:cNvPr>
@@ -4308,7 +4726,7 @@
           </p:cNvPicPr>
           <p:nvPr/>
         </p:nvPicPr>
-        <p:blipFill>
+        <p:blipFill rotWithShape="1">
           <a:blip r:embed="rId2">
             <a:extLst>
               <a:ext uri="{28A0092B-C50C-407E-A947-70E740481C1C}">
@@ -4316,15 +4734,58 @@
               </a:ext>
             </a:extLst>
           </a:blip>
-          <a:srcRect/>
-          <a:stretch>
-            <a:fillRect/>
-          </a:stretch>
+          <a:srcRect l="50227" t="22427" r="6971" b="22217"/>
+          <a:stretch/>
         </p:blipFill>
         <p:spPr bwMode="auto">
           <a:xfrm>
-            <a:off x="5635792" y="214618"/>
-            <a:ext cx="3059029" cy="3059029"/>
+            <a:off x="3789404" y="3104177"/>
+            <a:ext cx="1309345" cy="1693333"/>
+          </a:xfrm>
+          <a:prstGeom prst="rect">
+            <a:avLst/>
+          </a:prstGeom>
+          <a:noFill/>
+          <a:extLst>
+            <a:ext uri="{909E8E84-426E-40DD-AFC4-6F175D3DCCD1}">
+              <a14:hiddenFill xmlns:a14="http://schemas.microsoft.com/office/drawing/2010/main">
+                <a:solidFill>
+                  <a:srgbClr val="FFFFFF"/>
+                </a:solidFill>
+              </a14:hiddenFill>
+            </a:ext>
+          </a:extLst>
+        </p:spPr>
+      </p:pic>
+      <p:pic>
+        <p:nvPicPr>
+          <p:cNvPr id="10" name="Picture 4" descr="Pro Contra Icon - Illustrationen und Vektorgrafiken">
+            <a:extLst>
+              <a:ext uri="{FF2B5EF4-FFF2-40B4-BE49-F238E27FC236}">
+                <a16:creationId xmlns:a16="http://schemas.microsoft.com/office/drawing/2014/main" id="{3672DA63-C8E1-4FEB-8673-8785C006A76D}"/>
+              </a:ext>
+            </a:extLst>
+          </p:cNvPr>
+          <p:cNvPicPr>
+            <a:picLocks noChangeAspect="1" noChangeArrowheads="1"/>
+          </p:cNvPicPr>
+          <p:nvPr/>
+        </p:nvPicPr>
+        <p:blipFill rotWithShape="1">
+          <a:blip r:embed="rId2">
+            <a:extLst>
+              <a:ext uri="{28A0092B-C50C-407E-A947-70E740481C1C}">
+                <a14:useLocalDpi xmlns:a14="http://schemas.microsoft.com/office/drawing/2010/main" val="0"/>
+              </a:ext>
+            </a:extLst>
+          </a:blip>
+          <a:srcRect l="8612" t="22427" r="49716" b="22217"/>
+          <a:stretch/>
+        </p:blipFill>
+        <p:spPr bwMode="auto">
+          <a:xfrm>
+            <a:off x="10452049" y="2510023"/>
+            <a:ext cx="1274750" cy="1693333"/>
           </a:xfrm>
           <a:prstGeom prst="rect">
             <a:avLst/>
@@ -4712,8 +5173,8 @@
           </a:p>
         </p:txBody>
       </p:sp>
-      <mc:AlternateContent xmlns:mc="http://schemas.openxmlformats.org/markup-compatibility/2006">
-        <mc:Choice xmlns:a14="http://schemas.microsoft.com/office/drawing/2010/main" Requires="a14">
+      <mc:AlternateContent xmlns:mc="http://schemas.openxmlformats.org/markup-compatibility/2006" xmlns:a14="http://schemas.microsoft.com/office/drawing/2010/main">
+        <mc:Choice Requires="a14">
           <p:sp>
             <p:nvSpPr>
               <p:cNvPr id="3" name="Inhaltsplatzhalter 2">
@@ -4775,6 +5236,7 @@
                     <m:r>
                       <a:rPr lang="de-DE" i="1" smtClean="0">
                         <a:effectLst/>
+                        <a:latin typeface="Cambria Math" panose="02040503050406030204" pitchFamily="18" charset="0"/>
                         <a:ea typeface="Calibri" panose="020F0502020204030204" pitchFamily="34" charset="0"/>
                         <a:cs typeface="Times New Roman" panose="02020603050405020304" pitchFamily="18" charset="0"/>
                       </a:rPr>
@@ -4783,6 +5245,7 @@
                     <m:r>
                       <a:rPr lang="de-DE" i="1" smtClean="0">
                         <a:effectLst/>
+                        <a:latin typeface="Cambria Math" panose="02040503050406030204" pitchFamily="18" charset="0"/>
                         <a:ea typeface="Calibri" panose="020F0502020204030204" pitchFamily="34" charset="0"/>
                         <a:cs typeface="Times New Roman" panose="02020603050405020304" pitchFamily="18" charset="0"/>
                       </a:rPr>
@@ -4791,6 +5254,7 @@
                     <m:r>
                       <a:rPr lang="de-DE" i="1" smtClean="0">
                         <a:effectLst/>
+                        <a:latin typeface="Cambria Math" panose="02040503050406030204" pitchFamily="18" charset="0"/>
                         <a:ea typeface="Calibri" panose="020F0502020204030204" pitchFamily="34" charset="0"/>
                         <a:cs typeface="Times New Roman" panose="02020603050405020304" pitchFamily="18" charset="0"/>
                       </a:rPr>
@@ -4799,6 +5263,7 @@
                     <m:r>
                       <a:rPr lang="de-DE" i="1" smtClean="0">
                         <a:effectLst/>
+                        <a:latin typeface="Cambria Math" panose="02040503050406030204" pitchFamily="18" charset="0"/>
                         <a:ea typeface="Calibri" panose="020F0502020204030204" pitchFamily="34" charset="0"/>
                         <a:cs typeface="Times New Roman" panose="02020603050405020304" pitchFamily="18" charset="0"/>
                       </a:rPr>
@@ -4807,6 +5272,7 @@
                     <m:r>
                       <a:rPr lang="de-DE" i="1" smtClean="0">
                         <a:effectLst/>
+                        <a:latin typeface="Cambria Math" panose="02040503050406030204" pitchFamily="18" charset="0"/>
                         <a:ea typeface="Calibri" panose="020F0502020204030204" pitchFamily="34" charset="0"/>
                         <a:cs typeface="Times New Roman" panose="02020603050405020304" pitchFamily="18" charset="0"/>
                       </a:rPr>
@@ -4822,7 +5288,7 @@
             </p:txBody>
           </p:sp>
         </mc:Choice>
-        <mc:Fallback>
+        <mc:Fallback xmlns="">
           <p:sp>
             <p:nvSpPr>
               <p:cNvPr id="3" name="Inhaltsplatzhalter 2">
@@ -4976,8 +5442,8 @@
           </a:p>
         </p:txBody>
       </p:sp>
-      <mc:AlternateContent xmlns:mc="http://schemas.openxmlformats.org/markup-compatibility/2006">
-        <mc:Choice xmlns:a14="http://schemas.microsoft.com/office/drawing/2010/main" Requires="a14">
+      <mc:AlternateContent xmlns:mc="http://schemas.openxmlformats.org/markup-compatibility/2006" xmlns:a14="http://schemas.microsoft.com/office/drawing/2010/main">
+        <mc:Choice Requires="a14">
           <p:sp>
             <p:nvSpPr>
               <p:cNvPr id="3" name="Inhaltsplatzhalter 2">
@@ -5017,6 +5483,7 @@
                         <m:ctrlPr>
                           <a:rPr lang="de-DE" i="1" smtClean="0">
                             <a:effectLst/>
+                            <a:latin typeface="Cambria Math" panose="02040503050406030204" pitchFamily="18" charset="0"/>
                             <a:ea typeface="Yu Mincho" panose="02020400000000000000" pitchFamily="18" charset="-128"/>
                           </a:rPr>
                         </m:ctrlPr>
@@ -5025,6 +5492,7 @@
                         <m:r>
                           <a:rPr lang="de-DE" i="1">
                             <a:effectLst/>
+                            <a:latin typeface="Cambria Math" panose="02040503050406030204" pitchFamily="18" charset="0"/>
                             <a:ea typeface="Calibri" panose="020F0502020204030204" pitchFamily="34" charset="0"/>
                             <a:cs typeface="Times New Roman" panose="02020603050405020304" pitchFamily="18" charset="0"/>
                           </a:rPr>
@@ -5033,6 +5501,7 @@
                         <m:r>
                           <a:rPr lang="de-DE" i="1">
                             <a:effectLst/>
+                            <a:latin typeface="Cambria Math" panose="02040503050406030204" pitchFamily="18" charset="0"/>
                             <a:ea typeface="Calibri" panose="020F0502020204030204" pitchFamily="34" charset="0"/>
                             <a:cs typeface="Times New Roman" panose="02020603050405020304" pitchFamily="18" charset="0"/>
                           </a:rPr>
@@ -5041,6 +5510,7 @@
                         <m:r>
                           <a:rPr lang="de-DE" i="1">
                             <a:effectLst/>
+                            <a:latin typeface="Cambria Math" panose="02040503050406030204" pitchFamily="18" charset="0"/>
                             <a:ea typeface="Calibri" panose="020F0502020204030204" pitchFamily="34" charset="0"/>
                             <a:cs typeface="Times New Roman" panose="02020603050405020304" pitchFamily="18" charset="0"/>
                           </a:rPr>
@@ -5049,6 +5519,7 @@
                         <m:r>
                           <a:rPr lang="de-DE" i="1">
                             <a:effectLst/>
+                            <a:latin typeface="Cambria Math" panose="02040503050406030204" pitchFamily="18" charset="0"/>
                             <a:ea typeface="Calibri" panose="020F0502020204030204" pitchFamily="34" charset="0"/>
                             <a:cs typeface="Times New Roman" panose="02020603050405020304" pitchFamily="18" charset="0"/>
                           </a:rPr>
@@ -5057,6 +5528,7 @@
                         <m:r>
                           <a:rPr lang="de-DE" i="1">
                             <a:effectLst/>
+                            <a:latin typeface="Cambria Math" panose="02040503050406030204" pitchFamily="18" charset="0"/>
                             <a:ea typeface="Calibri" panose="020F0502020204030204" pitchFamily="34" charset="0"/>
                             <a:cs typeface="Times New Roman" panose="02020603050405020304" pitchFamily="18" charset="0"/>
                           </a:rPr>
@@ -5065,6 +5537,7 @@
                         <m:r>
                           <a:rPr lang="de-DE" i="1">
                             <a:effectLst/>
+                            <a:latin typeface="Cambria Math" panose="02040503050406030204" pitchFamily="18" charset="0"/>
                             <a:ea typeface="Calibri" panose="020F0502020204030204" pitchFamily="34" charset="0"/>
                             <a:cs typeface="Times New Roman" panose="02020603050405020304" pitchFamily="18" charset="0"/>
                           </a:rPr>
@@ -5073,6 +5546,7 @@
                         <m:r>
                           <a:rPr lang="de-DE" i="1">
                             <a:effectLst/>
+                            <a:latin typeface="Cambria Math" panose="02040503050406030204" pitchFamily="18" charset="0"/>
                             <a:ea typeface="Calibri" panose="020F0502020204030204" pitchFamily="34" charset="0"/>
                             <a:cs typeface="Times New Roman" panose="02020603050405020304" pitchFamily="18" charset="0"/>
                           </a:rPr>
@@ -5097,6 +5571,7 @@
                     <m:r>
                       <a:rPr lang="de-DE" i="1" smtClean="0">
                         <a:effectLst/>
+                        <a:latin typeface="Cambria Math" panose="02040503050406030204" pitchFamily="18" charset="0"/>
                         <a:ea typeface="Calibri" panose="020F0502020204030204" pitchFamily="34" charset="0"/>
                         <a:cs typeface="Times New Roman" panose="02020603050405020304" pitchFamily="18" charset="0"/>
                       </a:rPr>
@@ -5105,6 +5580,7 @@
                     <m:r>
                       <a:rPr lang="de-DE" i="1" smtClean="0">
                         <a:effectLst/>
+                        <a:latin typeface="Cambria Math" panose="02040503050406030204" pitchFamily="18" charset="0"/>
                         <a:ea typeface="Calibri" panose="020F0502020204030204" pitchFamily="34" charset="0"/>
                         <a:cs typeface="Times New Roman" panose="02020603050405020304" pitchFamily="18" charset="0"/>
                       </a:rPr>
@@ -5113,6 +5589,7 @@
                     <m:r>
                       <a:rPr lang="de-DE" i="1" smtClean="0">
                         <a:effectLst/>
+                        <a:latin typeface="Cambria Math" panose="02040503050406030204" pitchFamily="18" charset="0"/>
                         <a:ea typeface="Calibri" panose="020F0502020204030204" pitchFamily="34" charset="0"/>
                         <a:cs typeface="Times New Roman" panose="02020603050405020304" pitchFamily="18" charset="0"/>
                       </a:rPr>
@@ -5121,6 +5598,7 @@
                     <m:r>
                       <a:rPr lang="de-DE" i="1" smtClean="0">
                         <a:effectLst/>
+                        <a:latin typeface="Cambria Math" panose="02040503050406030204" pitchFamily="18" charset="0"/>
                         <a:ea typeface="Calibri" panose="020F0502020204030204" pitchFamily="34" charset="0"/>
                         <a:cs typeface="Times New Roman" panose="02020603050405020304" pitchFamily="18" charset="0"/>
                       </a:rPr>
@@ -5129,6 +5607,7 @@
                     <m:r>
                       <a:rPr lang="de-DE" i="1" smtClean="0">
                         <a:effectLst/>
+                        <a:latin typeface="Cambria Math" panose="02040503050406030204" pitchFamily="18" charset="0"/>
                         <a:ea typeface="Calibri" panose="020F0502020204030204" pitchFamily="34" charset="0"/>
                         <a:cs typeface="Times New Roman" panose="02020603050405020304" pitchFamily="18" charset="0"/>
                       </a:rPr>
@@ -5151,6 +5630,7 @@
                     <m:r>
                       <a:rPr lang="de-DE" i="1" smtClean="0">
                         <a:effectLst/>
+                        <a:latin typeface="Cambria Math" panose="02040503050406030204" pitchFamily="18" charset="0"/>
                         <a:ea typeface="Calibri" panose="020F0502020204030204" pitchFamily="34" charset="0"/>
                       </a:rPr>
                       <m:t>𝑞</m:t>
@@ -5158,6 +5638,7 @@
                     <m:r>
                       <a:rPr lang="de-DE" i="1" smtClean="0">
                         <a:effectLst/>
+                        <a:latin typeface="Cambria Math" panose="02040503050406030204" pitchFamily="18" charset="0"/>
                         <a:ea typeface="Calibri" panose="020F0502020204030204" pitchFamily="34" charset="0"/>
                       </a:rPr>
                       <m:t>=</m:t>
@@ -5165,6 +5646,7 @@
                     <m:r>
                       <a:rPr lang="de-DE" i="1" smtClean="0">
                         <a:effectLst/>
+                        <a:latin typeface="Cambria Math" panose="02040503050406030204" pitchFamily="18" charset="0"/>
                         <a:ea typeface="Calibri" panose="020F0502020204030204" pitchFamily="34" charset="0"/>
                       </a:rPr>
                       <m:t>𝑠</m:t>
@@ -5172,6 +5654,7 @@
                     <m:r>
                       <a:rPr lang="de-DE" i="1" smtClean="0">
                         <a:effectLst/>
+                        <a:latin typeface="Cambria Math" panose="02040503050406030204" pitchFamily="18" charset="0"/>
                         <a:ea typeface="Calibri" panose="020F0502020204030204" pitchFamily="34" charset="0"/>
                       </a:rPr>
                       <m:t>+</m:t>
@@ -5179,6 +5662,7 @@
                     <m:r>
                       <a:rPr lang="de-DE" i="1" smtClean="0">
                         <a:effectLst/>
+                        <a:latin typeface="Cambria Math" panose="02040503050406030204" pitchFamily="18" charset="0"/>
                         <a:ea typeface="Calibri" panose="020F0502020204030204" pitchFamily="34" charset="0"/>
                       </a:rPr>
                       <m:t>𝑖𝑥</m:t>
@@ -5186,6 +5670,7 @@
                     <m:r>
                       <a:rPr lang="de-DE" i="1" smtClean="0">
                         <a:effectLst/>
+                        <a:latin typeface="Cambria Math" panose="02040503050406030204" pitchFamily="18" charset="0"/>
                         <a:ea typeface="Calibri" panose="020F0502020204030204" pitchFamily="34" charset="0"/>
                       </a:rPr>
                       <m:t>+</m:t>
@@ -5193,6 +5678,7 @@
                     <m:r>
                       <a:rPr lang="de-DE" i="1" smtClean="0">
                         <a:effectLst/>
+                        <a:latin typeface="Cambria Math" panose="02040503050406030204" pitchFamily="18" charset="0"/>
                         <a:ea typeface="Calibri" panose="020F0502020204030204" pitchFamily="34" charset="0"/>
                       </a:rPr>
                       <m:t>𝑗𝑦</m:t>
@@ -5200,6 +5686,7 @@
                     <m:r>
                       <a:rPr lang="de-DE" i="1" smtClean="0">
                         <a:effectLst/>
+                        <a:latin typeface="Cambria Math" panose="02040503050406030204" pitchFamily="18" charset="0"/>
                         <a:ea typeface="Calibri" panose="020F0502020204030204" pitchFamily="34" charset="0"/>
                       </a:rPr>
                       <m:t>+</m:t>
@@ -5207,6 +5694,7 @@
                     <m:r>
                       <a:rPr lang="de-DE" i="1" smtClean="0">
                         <a:effectLst/>
+                        <a:latin typeface="Cambria Math" panose="02040503050406030204" pitchFamily="18" charset="0"/>
                         <a:ea typeface="Calibri" panose="020F0502020204030204" pitchFamily="34" charset="0"/>
                       </a:rPr>
                       <m:t>𝑘𝑧</m:t>
@@ -5234,6 +5722,7 @@
                     <m:r>
                       <a:rPr lang="de-DE" i="1" smtClean="0">
                         <a:effectLst/>
+                        <a:latin typeface="Cambria Math" panose="02040503050406030204" pitchFamily="18" charset="0"/>
                         <a:ea typeface="Calibri" panose="020F0502020204030204" pitchFamily="34" charset="0"/>
                       </a:rPr>
                       <m:t>𝑞</m:t>
@@ -5241,6 +5730,7 @@
                     <m:r>
                       <a:rPr lang="de-DE" i="1" smtClean="0">
                         <a:effectLst/>
+                        <a:latin typeface="Cambria Math" panose="02040503050406030204" pitchFamily="18" charset="0"/>
                         <a:ea typeface="Calibri" panose="020F0502020204030204" pitchFamily="34" charset="0"/>
                       </a:rPr>
                       <m:t>=</m:t>
@@ -5252,6 +5742,7 @@
                         <m:ctrlPr>
                           <a:rPr lang="de-DE" i="1">
                             <a:effectLst/>
+                            <a:latin typeface="Cambria Math" panose="02040503050406030204" pitchFamily="18" charset="0"/>
                             <a:ea typeface="Calibri" panose="020F0502020204030204" pitchFamily="34" charset="0"/>
                           </a:rPr>
                         </m:ctrlPr>
@@ -5260,6 +5751,7 @@
                         <m:r>
                           <a:rPr lang="de-DE" i="1">
                             <a:effectLst/>
+                            <a:latin typeface="Cambria Math" panose="02040503050406030204" pitchFamily="18" charset="0"/>
                             <a:ea typeface="Calibri" panose="020F0502020204030204" pitchFamily="34" charset="0"/>
                           </a:rPr>
                           <m:t>𝑠</m:t>
@@ -5267,6 +5759,7 @@
                         <m:r>
                           <a:rPr lang="de-DE" i="1">
                             <a:effectLst/>
+                            <a:latin typeface="Cambria Math" panose="02040503050406030204" pitchFamily="18" charset="0"/>
                             <a:ea typeface="Calibri" panose="020F0502020204030204" pitchFamily="34" charset="0"/>
                           </a:rPr>
                           <m:t>,</m:t>
@@ -5276,6 +5769,7 @@
                             <m:ctrlPr>
                               <a:rPr lang="de-DE" i="1">
                                 <a:effectLst/>
+                                <a:latin typeface="Cambria Math" panose="02040503050406030204" pitchFamily="18" charset="0"/>
                                 <a:ea typeface="Calibri" panose="020F0502020204030204" pitchFamily="34" charset="0"/>
                               </a:rPr>
                             </m:ctrlPr>
@@ -5286,6 +5780,7 @@
                                 <m:ctrlPr>
                                   <a:rPr lang="de-DE" i="1">
                                     <a:effectLst/>
+                                    <a:latin typeface="Cambria Math" panose="02040503050406030204" pitchFamily="18" charset="0"/>
                                     <a:ea typeface="Calibri" panose="020F0502020204030204" pitchFamily="34" charset="0"/>
                                   </a:rPr>
                                 </m:ctrlPr>
@@ -5294,6 +5789,7 @@
                                 <m:r>
                                   <a:rPr lang="de-DE" i="1">
                                     <a:effectLst/>
+                                    <a:latin typeface="Cambria Math" panose="02040503050406030204" pitchFamily="18" charset="0"/>
                                     <a:ea typeface="Calibri" panose="020F0502020204030204" pitchFamily="34" charset="0"/>
                                   </a:rPr>
                                   <m:t>𝑥</m:t>
@@ -5303,6 +5799,7 @@
                                 <m:r>
                                   <a:rPr lang="de-DE" i="1">
                                     <a:effectLst/>
+                                    <a:latin typeface="Cambria Math" panose="02040503050406030204" pitchFamily="18" charset="0"/>
                                     <a:ea typeface="Calibri" panose="020F0502020204030204" pitchFamily="34" charset="0"/>
                                   </a:rPr>
                                   <m:t>𝑦</m:t>
@@ -5312,6 +5809,7 @@
                                 <m:r>
                                   <a:rPr lang="de-DE" i="1">
                                     <a:effectLst/>
+                                    <a:latin typeface="Cambria Math" panose="02040503050406030204" pitchFamily="18" charset="0"/>
                                     <a:ea typeface="Calibri" panose="020F0502020204030204" pitchFamily="34" charset="0"/>
                                   </a:rPr>
                                   <m:t>𝑧</m:t>
@@ -5335,7 +5833,7 @@
             </p:txBody>
           </p:sp>
         </mc:Choice>
-        <mc:Fallback>
+        <mc:Fallback xmlns="">
           <p:sp>
             <p:nvSpPr>
               <p:cNvPr id="3" name="Inhaltsplatzhalter 2">
@@ -5442,8 +5940,8 @@
           </a:p>
         </p:txBody>
       </p:sp>
-      <mc:AlternateContent xmlns:mc="http://schemas.openxmlformats.org/markup-compatibility/2006">
-        <mc:Choice xmlns:a14="http://schemas.microsoft.com/office/drawing/2010/main" Requires="a14">
+      <mc:AlternateContent xmlns:mc="http://schemas.openxmlformats.org/markup-compatibility/2006" xmlns:a14="http://schemas.microsoft.com/office/drawing/2010/main">
+        <mc:Choice Requires="a14">
           <p:sp>
             <p:nvSpPr>
               <p:cNvPr id="3" name="Inhaltsplatzhalter 2">
@@ -5495,6 +5993,7 @@
                         <m:ctrlPr>
                           <a:rPr lang="de-DE" i="1" smtClean="0">
                             <a:effectLst/>
+                            <a:latin typeface="Cambria Math" panose="02040503050406030204" pitchFamily="18" charset="0"/>
                             <a:ea typeface="Calibri" panose="020F0502020204030204" pitchFamily="34" charset="0"/>
                           </a:rPr>
                         </m:ctrlPr>
@@ -5503,6 +6002,7 @@
                         <m:r>
                           <a:rPr lang="de-DE" i="1">
                             <a:effectLst/>
+                            <a:latin typeface="Cambria Math" panose="02040503050406030204" pitchFamily="18" charset="0"/>
                             <a:ea typeface="Calibri" panose="020F0502020204030204" pitchFamily="34" charset="0"/>
                           </a:rPr>
                           <m:t>𝑖</m:t>
@@ -5512,6 +6012,7 @@
                         <m:r>
                           <a:rPr lang="de-DE">
                             <a:effectLst/>
+                            <a:latin typeface="Cambria Math" panose="02040503050406030204" pitchFamily="18" charset="0"/>
                             <a:ea typeface="Calibri" panose="020F0502020204030204" pitchFamily="34" charset="0"/>
                           </a:rPr>
                           <m:t>2</m:t>
@@ -5521,6 +6022,7 @@
                     <m:r>
                       <a:rPr lang="de-DE">
                         <a:effectLst/>
+                        <a:latin typeface="Cambria Math" panose="02040503050406030204" pitchFamily="18" charset="0"/>
                         <a:ea typeface="Calibri" panose="020F0502020204030204" pitchFamily="34" charset="0"/>
                       </a:rPr>
                       <m:t>=</m:t>
@@ -5530,6 +6032,7 @@
                         <m:ctrlPr>
                           <a:rPr lang="de-DE" i="1">
                             <a:effectLst/>
+                            <a:latin typeface="Cambria Math" panose="02040503050406030204" pitchFamily="18" charset="0"/>
                             <a:ea typeface="Calibri" panose="020F0502020204030204" pitchFamily="34" charset="0"/>
                           </a:rPr>
                         </m:ctrlPr>
@@ -5538,6 +6041,7 @@
                         <m:r>
                           <a:rPr lang="de-DE" i="1">
                             <a:effectLst/>
+                            <a:latin typeface="Cambria Math" panose="02040503050406030204" pitchFamily="18" charset="0"/>
                             <a:ea typeface="Calibri" panose="020F0502020204030204" pitchFamily="34" charset="0"/>
                           </a:rPr>
                           <m:t>𝑘</m:t>
@@ -5547,6 +6051,7 @@
                         <m:r>
                           <a:rPr lang="de-DE">
                             <a:effectLst/>
+                            <a:latin typeface="Cambria Math" panose="02040503050406030204" pitchFamily="18" charset="0"/>
                             <a:ea typeface="Calibri" panose="020F0502020204030204" pitchFamily="34" charset="0"/>
                           </a:rPr>
                           <m:t>2</m:t>
@@ -5556,6 +6061,7 @@
                     <m:r>
                       <a:rPr lang="de-DE">
                         <a:effectLst/>
+                        <a:latin typeface="Cambria Math" panose="02040503050406030204" pitchFamily="18" charset="0"/>
                         <a:ea typeface="Calibri" panose="020F0502020204030204" pitchFamily="34" charset="0"/>
                       </a:rPr>
                       <m:t>=</m:t>
@@ -5565,6 +6071,7 @@
                         <m:ctrlPr>
                           <a:rPr lang="de-DE" i="1">
                             <a:effectLst/>
+                            <a:latin typeface="Cambria Math" panose="02040503050406030204" pitchFamily="18" charset="0"/>
                             <a:ea typeface="Calibri" panose="020F0502020204030204" pitchFamily="34" charset="0"/>
                           </a:rPr>
                         </m:ctrlPr>
@@ -5573,6 +6080,7 @@
                         <m:r>
                           <a:rPr lang="de-DE" i="1">
                             <a:effectLst/>
+                            <a:latin typeface="Cambria Math" panose="02040503050406030204" pitchFamily="18" charset="0"/>
                             <a:ea typeface="Calibri" panose="020F0502020204030204" pitchFamily="34" charset="0"/>
                           </a:rPr>
                           <m:t>𝑗</m:t>
@@ -5582,6 +6090,7 @@
                         <m:r>
                           <a:rPr lang="de-DE">
                             <a:effectLst/>
+                            <a:latin typeface="Cambria Math" panose="02040503050406030204" pitchFamily="18" charset="0"/>
                             <a:ea typeface="Calibri" panose="020F0502020204030204" pitchFamily="34" charset="0"/>
                           </a:rPr>
                           <m:t>2</m:t>
@@ -5591,6 +6100,7 @@
                     <m:r>
                       <a:rPr lang="de-DE">
                         <a:effectLst/>
+                        <a:latin typeface="Cambria Math" panose="02040503050406030204" pitchFamily="18" charset="0"/>
                         <a:ea typeface="Calibri" panose="020F0502020204030204" pitchFamily="34" charset="0"/>
                       </a:rPr>
                       <m:t>=</m:t>
@@ -5598,6 +6108,7 @@
                     <m:r>
                       <a:rPr lang="de-DE" i="1">
                         <a:effectLst/>
+                        <a:latin typeface="Cambria Math" panose="02040503050406030204" pitchFamily="18" charset="0"/>
                         <a:ea typeface="Calibri" panose="020F0502020204030204" pitchFamily="34" charset="0"/>
                       </a:rPr>
                       <m:t>−</m:t>
@@ -5605,6 +6116,7 @@
                     <m:r>
                       <a:rPr lang="de-DE">
                         <a:effectLst/>
+                        <a:latin typeface="Cambria Math" panose="02040503050406030204" pitchFamily="18" charset="0"/>
                         <a:ea typeface="Calibri" panose="020F0502020204030204" pitchFamily="34" charset="0"/>
                       </a:rPr>
                       <m:t>1</m:t>
@@ -5627,27 +6139,39 @@
                 <a14:m>
                   <m:oMath xmlns:m="http://schemas.openxmlformats.org/officeDocument/2006/math">
                     <m:r>
-                      <a:rPr lang="de-DE" b="0" i="0" smtClean="0"/>
+                      <a:rPr lang="de-DE" b="0" i="0" smtClean="0">
+                        <a:latin typeface="Cambria Math" panose="02040503050406030204" pitchFamily="18" charset="0"/>
+                      </a:rPr>
                       <m:t> </m:t>
                     </m:r>
                     <m:r>
-                      <a:rPr lang="de-DE" i="1"/>
+                      <a:rPr lang="de-DE" i="1">
+                        <a:latin typeface="Cambria Math" panose="02040503050406030204" pitchFamily="18" charset="0"/>
+                      </a:rPr>
                       <m:t>𝑖</m:t>
                     </m:r>
                     <m:r>
-                      <a:rPr lang="de-DE" i="1"/>
+                      <a:rPr lang="de-DE" i="1">
+                        <a:latin typeface="Cambria Math" panose="02040503050406030204" pitchFamily="18" charset="0"/>
+                      </a:rPr>
                       <m:t>∙</m:t>
                     </m:r>
                     <m:r>
-                      <a:rPr lang="de-DE" i="1"/>
+                      <a:rPr lang="de-DE" i="1">
+                        <a:latin typeface="Cambria Math" panose="02040503050406030204" pitchFamily="18" charset="0"/>
+                      </a:rPr>
                       <m:t>𝑗</m:t>
                     </m:r>
                     <m:r>
-                      <a:rPr lang="de-DE" i="1"/>
+                      <a:rPr lang="de-DE" i="1">
+                        <a:latin typeface="Cambria Math" panose="02040503050406030204" pitchFamily="18" charset="0"/>
+                      </a:rPr>
                       <m:t>=</m:t>
                     </m:r>
                     <m:r>
-                      <a:rPr lang="de-DE" i="1"/>
+                      <a:rPr lang="de-DE" i="1">
+                        <a:latin typeface="Cambria Math" panose="02040503050406030204" pitchFamily="18" charset="0"/>
+                      </a:rPr>
                       <m:t>𝑘</m:t>
                     </m:r>
                   </m:oMath>
@@ -5659,23 +6183,33 @@
                 <a14:m>
                   <m:oMath xmlns:m="http://schemas.openxmlformats.org/officeDocument/2006/math">
                     <m:r>
-                      <a:rPr lang="de-DE" i="1"/>
+                      <a:rPr lang="de-DE" i="1">
+                        <a:latin typeface="Cambria Math" panose="02040503050406030204" pitchFamily="18" charset="0"/>
+                      </a:rPr>
                       <m:t>𝑗</m:t>
                     </m:r>
                     <m:r>
-                      <a:rPr lang="de-DE" i="1"/>
+                      <a:rPr lang="de-DE" i="1">
+                        <a:latin typeface="Cambria Math" panose="02040503050406030204" pitchFamily="18" charset="0"/>
+                      </a:rPr>
                       <m:t>∙</m:t>
                     </m:r>
                     <m:r>
-                      <a:rPr lang="de-DE" i="1"/>
+                      <a:rPr lang="de-DE" i="1">
+                        <a:latin typeface="Cambria Math" panose="02040503050406030204" pitchFamily="18" charset="0"/>
+                      </a:rPr>
                       <m:t>𝑘</m:t>
                     </m:r>
                     <m:r>
-                      <a:rPr lang="de-DE" i="1"/>
+                      <a:rPr lang="de-DE" i="1">
+                        <a:latin typeface="Cambria Math" panose="02040503050406030204" pitchFamily="18" charset="0"/>
+                      </a:rPr>
                       <m:t>=</m:t>
                     </m:r>
                     <m:r>
-                      <a:rPr lang="de-DE" i="1"/>
+                      <a:rPr lang="de-DE" i="1">
+                        <a:latin typeface="Cambria Math" panose="02040503050406030204" pitchFamily="18" charset="0"/>
+                      </a:rPr>
                       <m:t>𝑖</m:t>
                     </m:r>
                   </m:oMath>
@@ -5687,23 +6221,33 @@
                 <a14:m>
                   <m:oMath xmlns:m="http://schemas.openxmlformats.org/officeDocument/2006/math">
                     <m:r>
-                      <a:rPr lang="de-DE" i="1"/>
+                      <a:rPr lang="de-DE" i="1">
+                        <a:latin typeface="Cambria Math" panose="02040503050406030204" pitchFamily="18" charset="0"/>
+                      </a:rPr>
                       <m:t>𝑘</m:t>
                     </m:r>
                     <m:r>
-                      <a:rPr lang="de-DE" i="1"/>
+                      <a:rPr lang="de-DE" i="1">
+                        <a:latin typeface="Cambria Math" panose="02040503050406030204" pitchFamily="18" charset="0"/>
+                      </a:rPr>
                       <m:t>∙</m:t>
                     </m:r>
                     <m:r>
-                      <a:rPr lang="de-DE" i="1"/>
+                      <a:rPr lang="de-DE" i="1">
+                        <a:latin typeface="Cambria Math" panose="02040503050406030204" pitchFamily="18" charset="0"/>
+                      </a:rPr>
                       <m:t>𝑖</m:t>
                     </m:r>
                     <m:r>
-                      <a:rPr lang="de-DE" i="1"/>
+                      <a:rPr lang="de-DE" i="1">
+                        <a:latin typeface="Cambria Math" panose="02040503050406030204" pitchFamily="18" charset="0"/>
+                      </a:rPr>
                       <m:t>=</m:t>
                     </m:r>
                     <m:r>
-                      <a:rPr lang="de-DE" i="1"/>
+                      <a:rPr lang="de-DE" i="1">
+                        <a:latin typeface="Cambria Math" panose="02040503050406030204" pitchFamily="18" charset="0"/>
+                      </a:rPr>
                       <m:t>𝑗</m:t>
                     </m:r>
                   </m:oMath>
@@ -5732,6 +6276,7 @@
                     <m:r>
                       <a:rPr lang="de-DE" i="1" smtClean="0">
                         <a:effectLst/>
+                        <a:latin typeface="Cambria Math" panose="02040503050406030204" pitchFamily="18" charset="0"/>
                         <a:ea typeface="Yu Mincho" panose="02020400000000000000" pitchFamily="18" charset="-128"/>
                       </a:rPr>
                       <m:t>𝑗</m:t>
@@ -5739,6 +6284,7 @@
                     <m:r>
                       <a:rPr lang="de-DE" i="1">
                         <a:effectLst/>
+                        <a:latin typeface="Cambria Math" panose="02040503050406030204" pitchFamily="18" charset="0"/>
                         <a:ea typeface="Calibri" panose="020F0502020204030204" pitchFamily="34" charset="0"/>
                       </a:rPr>
                       <m:t>∙</m:t>
@@ -5746,6 +6292,7 @@
                     <m:r>
                       <a:rPr lang="de-DE" i="1">
                         <a:effectLst/>
+                        <a:latin typeface="Cambria Math" panose="02040503050406030204" pitchFamily="18" charset="0"/>
                         <a:ea typeface="Calibri" panose="020F0502020204030204" pitchFamily="34" charset="0"/>
                       </a:rPr>
                       <m:t>𝑖</m:t>
@@ -5753,6 +6300,7 @@
                     <m:r>
                       <a:rPr lang="de-DE" i="1">
                         <a:effectLst/>
+                        <a:latin typeface="Cambria Math" panose="02040503050406030204" pitchFamily="18" charset="0"/>
                         <a:ea typeface="Calibri" panose="020F0502020204030204" pitchFamily="34" charset="0"/>
                       </a:rPr>
                       <m:t>=−</m:t>
@@ -5760,6 +6308,7 @@
                     <m:r>
                       <a:rPr lang="de-DE" i="1">
                         <a:effectLst/>
+                        <a:latin typeface="Cambria Math" panose="02040503050406030204" pitchFamily="18" charset="0"/>
                         <a:ea typeface="Calibri" panose="020F0502020204030204" pitchFamily="34" charset="0"/>
                       </a:rPr>
                       <m:t>𝑘</m:t>
@@ -5787,6 +6336,7 @@
                     <m:r>
                       <a:rPr lang="de-DE" i="1">
                         <a:effectLst/>
+                        <a:latin typeface="Cambria Math" panose="02040503050406030204" pitchFamily="18" charset="0"/>
                         <a:ea typeface="Yu Mincho" panose="02020400000000000000" pitchFamily="18" charset="-128"/>
                       </a:rPr>
                       <m:t>𝑖</m:t>
@@ -5794,6 +6344,7 @@
                     <m:r>
                       <a:rPr lang="de-DE" i="1">
                         <a:effectLst/>
+                        <a:latin typeface="Cambria Math" panose="02040503050406030204" pitchFamily="18" charset="0"/>
                         <a:ea typeface="Calibri" panose="020F0502020204030204" pitchFamily="34" charset="0"/>
                       </a:rPr>
                       <m:t>∙</m:t>
@@ -5801,6 +6352,7 @@
                     <m:r>
                       <a:rPr lang="de-DE" i="1">
                         <a:effectLst/>
+                        <a:latin typeface="Cambria Math" panose="02040503050406030204" pitchFamily="18" charset="0"/>
                         <a:ea typeface="Calibri" panose="020F0502020204030204" pitchFamily="34" charset="0"/>
                       </a:rPr>
                       <m:t>𝑘</m:t>
@@ -5808,6 +6360,7 @@
                     <m:r>
                       <a:rPr lang="de-DE" i="1">
                         <a:effectLst/>
+                        <a:latin typeface="Cambria Math" panose="02040503050406030204" pitchFamily="18" charset="0"/>
                         <a:ea typeface="Calibri" panose="020F0502020204030204" pitchFamily="34" charset="0"/>
                       </a:rPr>
                       <m:t>=−</m:t>
@@ -5815,6 +6368,7 @@
                     <m:r>
                       <a:rPr lang="de-DE" i="1">
                         <a:effectLst/>
+                        <a:latin typeface="Cambria Math" panose="02040503050406030204" pitchFamily="18" charset="0"/>
                         <a:ea typeface="Calibri" panose="020F0502020204030204" pitchFamily="34" charset="0"/>
                       </a:rPr>
                       <m:t>𝑗</m:t>
@@ -5834,6 +6388,7 @@
                     <m:r>
                       <a:rPr lang="de-DE" i="1">
                         <a:effectLst/>
+                        <a:latin typeface="Cambria Math" panose="02040503050406030204" pitchFamily="18" charset="0"/>
                         <a:ea typeface="Yu Mincho" panose="02020400000000000000" pitchFamily="18" charset="-128"/>
                         <a:cs typeface="Times New Roman" panose="02020603050405020304" pitchFamily="18" charset="0"/>
                       </a:rPr>
@@ -5842,6 +6397,7 @@
                     <m:r>
                       <a:rPr lang="de-DE" i="1">
                         <a:effectLst/>
+                        <a:latin typeface="Cambria Math" panose="02040503050406030204" pitchFamily="18" charset="0"/>
                         <a:ea typeface="Calibri" panose="020F0502020204030204" pitchFamily="34" charset="0"/>
                       </a:rPr>
                       <m:t>∙</m:t>
@@ -5849,6 +6405,7 @@
                     <m:r>
                       <a:rPr lang="de-DE" i="1">
                         <a:effectLst/>
+                        <a:latin typeface="Cambria Math" panose="02040503050406030204" pitchFamily="18" charset="0"/>
                         <a:ea typeface="Calibri" panose="020F0502020204030204" pitchFamily="34" charset="0"/>
                       </a:rPr>
                       <m:t>𝑗</m:t>
@@ -5856,6 +6413,7 @@
                     <m:r>
                       <a:rPr lang="de-DE" i="1">
                         <a:effectLst/>
+                        <a:latin typeface="Cambria Math" panose="02040503050406030204" pitchFamily="18" charset="0"/>
                         <a:ea typeface="Calibri" panose="020F0502020204030204" pitchFamily="34" charset="0"/>
                       </a:rPr>
                       <m:t>=−</m:t>
@@ -5863,6 +6421,7 @@
                     <m:r>
                       <a:rPr lang="de-DE" i="1">
                         <a:effectLst/>
+                        <a:latin typeface="Cambria Math" panose="02040503050406030204" pitchFamily="18" charset="0"/>
                         <a:ea typeface="Calibri" panose="020F0502020204030204" pitchFamily="34" charset="0"/>
                       </a:rPr>
                       <m:t>𝑖</m:t>
@@ -5887,7 +6446,7 @@
             </p:txBody>
           </p:sp>
         </mc:Choice>
-        <mc:Fallback>
+        <mc:Fallback xmlns="">
           <p:sp>
             <p:nvSpPr>
               <p:cNvPr id="3" name="Inhaltsplatzhalter 2">

</xml_diff>

<commit_message>
Gimbal Lock ppp final
</commit_message>
<xml_diff>
--- a/Quaternionen Präsentation.pptx
+++ b/Quaternionen Präsentation.pptx
@@ -4117,10 +4117,6 @@
           <a:lstStyle/>
           <a:p>
             <a:r>
-              <a:rPr lang="de-DE" dirty="0"/>
-              <a:t>Wiederholung: </a:t>
-            </a:r>
-            <a:r>
               <a:rPr lang="de-DE" dirty="0" err="1"/>
               <a:t>Gimbal</a:t>
             </a:r>
@@ -4158,12 +4154,26 @@
           <a:lstStyle/>
           <a:p>
             <a:r>
-              <a:rPr lang="de-DE" dirty="0" err="1"/>
-              <a:t>Gimbal</a:t>
-            </a:r>
-            <a:r>
               <a:rPr lang="de-DE" dirty="0"/>
-              <a:t> Lock</a:t>
+              <a:t>drei konzentrische Ringe</a:t>
+            </a:r>
+          </a:p>
+          <a:p>
+            <a:endParaRPr lang="de-DE" dirty="0"/>
+          </a:p>
+          <a:p>
+            <a:r>
+              <a:rPr lang="de-DE" dirty="0"/>
+              <a:t>Ring = Achse</a:t>
+            </a:r>
+          </a:p>
+          <a:p>
+            <a:endParaRPr lang="de-DE" dirty="0"/>
+          </a:p>
+          <a:p>
+            <a:r>
+              <a:rPr lang="de-DE" dirty="0"/>
+              <a:t>Verlust Freiheitsgrad</a:t>
             </a:r>
           </a:p>
         </p:txBody>

</xml_diff>